<commit_message>
adding today ppt traffic
</commit_message>
<xml_diff>
--- a/Trafico_20201226.pptx
+++ b/Trafico_20201226.pptx
@@ -3116,14 +3116,14 @@
               <a:defRPr sz="1200"/>
             </a:pPr>
             <a:r>
-              <a:t>2020-12-22 07:00:00</a:t>
+              <a:t>2020-12-25 07:00:00</a:t>
             </a:r>
           </a:p>
         </p:txBody>
       </p:sp>
       <p:pic>
         <p:nvPicPr>
-          <p:cNvPr id="3" name="Picture 2" descr="2020_12_22_07_00.png"/>
+          <p:cNvPr id="3" name="Picture 2" descr="2020_12_25_07_00.png"/>
           <p:cNvPicPr>
             <a:picLocks noChangeAspect="1"/>
           </p:cNvPicPr>
@@ -3172,14 +3172,14 @@
               <a:defRPr sz="1200"/>
             </a:pPr>
             <a:r>
-              <a:t>2020-12-22 12:00:00</a:t>
+              <a:t>2020-12-25 12:00:00</a:t>
             </a:r>
           </a:p>
         </p:txBody>
       </p:sp>
       <p:pic>
         <p:nvPicPr>
-          <p:cNvPr id="5" name="Picture 4" descr="2020_12_22_12_00.png"/>
+          <p:cNvPr id="5" name="Picture 4" descr="2020_12_25_12_00.png"/>
           <p:cNvPicPr>
             <a:picLocks noChangeAspect="1"/>
           </p:cNvPicPr>
@@ -3228,14 +3228,14 @@
               <a:defRPr sz="1200"/>
             </a:pPr>
             <a:r>
-              <a:t>2020-12-22 19:00:00</a:t>
+              <a:t>2020-12-25 19:00:00</a:t>
             </a:r>
           </a:p>
         </p:txBody>
       </p:sp>
       <p:pic>
         <p:nvPicPr>
-          <p:cNvPr id="7" name="Picture 6" descr="2020_12_22_19_00.png"/>
+          <p:cNvPr id="7" name="Picture 6" descr="2020_12_25_19_00.png"/>
           <p:cNvPicPr>
             <a:picLocks noChangeAspect="1"/>
           </p:cNvPicPr>
@@ -3302,14 +3302,14 @@
               <a:defRPr sz="1200"/>
             </a:pPr>
             <a:r>
-              <a:t>2020-12-23 07:00:00</a:t>
+              <a:t>2020-12-26 07:00:00</a:t>
             </a:r>
           </a:p>
         </p:txBody>
       </p:sp>
       <p:pic>
         <p:nvPicPr>
-          <p:cNvPr id="3" name="Picture 2" descr="2020_12_23_07_00.png"/>
+          <p:cNvPr id="3" name="Picture 2" descr="2020_12_26_07_00.png"/>
           <p:cNvPicPr>
             <a:picLocks noChangeAspect="1"/>
           </p:cNvPicPr>
@@ -3358,14 +3358,14 @@
               <a:defRPr sz="1200"/>
             </a:pPr>
             <a:r>
-              <a:t>2020-12-24 07:00:00</a:t>
+              <a:t>2020-12-26 12:00:00</a:t>
             </a:r>
           </a:p>
         </p:txBody>
       </p:sp>
       <p:pic>
         <p:nvPicPr>
-          <p:cNvPr id="5" name="Picture 4" descr="2020_12_24_07_00.png"/>
+          <p:cNvPr id="5" name="Picture 4" descr="2020_12_26_12_00.png"/>
           <p:cNvPicPr>
             <a:picLocks noChangeAspect="1"/>
           </p:cNvPicPr>

</xml_diff>